<commit_message>
Actualización de documentos y referencias a librerías en ASN
</commit_message>
<xml_diff>
--- a/Documentos/Prototipos ASN.pptx
+++ b/Documentos/Prototipos ASN.pptx
@@ -282,7 +282,7 @@
           <a:p>
             <a:fld id="{12D47082-DEE0-4172-B4B5-F7FDE94EB7DD}" type="datetimeFigureOut">
               <a:rPr lang="es-MX" smtClean="0"/>
-              <a:t>18/02/2019</a:t>
+              <a:t>21/02/2019</a:t>
             </a:fld>
             <a:endParaRPr lang="es-MX"/>
           </a:p>
@@ -482,7 +482,7 @@
           <a:p>
             <a:fld id="{12D47082-DEE0-4172-B4B5-F7FDE94EB7DD}" type="datetimeFigureOut">
               <a:rPr lang="es-MX" smtClean="0"/>
-              <a:t>18/02/2019</a:t>
+              <a:t>21/02/2019</a:t>
             </a:fld>
             <a:endParaRPr lang="es-MX"/>
           </a:p>
@@ -692,7 +692,7 @@
           <a:p>
             <a:fld id="{12D47082-DEE0-4172-B4B5-F7FDE94EB7DD}" type="datetimeFigureOut">
               <a:rPr lang="es-MX" smtClean="0"/>
-              <a:t>18/02/2019</a:t>
+              <a:t>21/02/2019</a:t>
             </a:fld>
             <a:endParaRPr lang="es-MX"/>
           </a:p>
@@ -892,7 +892,7 @@
           <a:p>
             <a:fld id="{12D47082-DEE0-4172-B4B5-F7FDE94EB7DD}" type="datetimeFigureOut">
               <a:rPr lang="es-MX" smtClean="0"/>
-              <a:t>18/02/2019</a:t>
+              <a:t>21/02/2019</a:t>
             </a:fld>
             <a:endParaRPr lang="es-MX"/>
           </a:p>
@@ -1168,7 +1168,7 @@
           <a:p>
             <a:fld id="{12D47082-DEE0-4172-B4B5-F7FDE94EB7DD}" type="datetimeFigureOut">
               <a:rPr lang="es-MX" smtClean="0"/>
-              <a:t>18/02/2019</a:t>
+              <a:t>21/02/2019</a:t>
             </a:fld>
             <a:endParaRPr lang="es-MX"/>
           </a:p>
@@ -1436,7 +1436,7 @@
           <a:p>
             <a:fld id="{12D47082-DEE0-4172-B4B5-F7FDE94EB7DD}" type="datetimeFigureOut">
               <a:rPr lang="es-MX" smtClean="0"/>
-              <a:t>18/02/2019</a:t>
+              <a:t>21/02/2019</a:t>
             </a:fld>
             <a:endParaRPr lang="es-MX"/>
           </a:p>
@@ -1851,7 +1851,7 @@
           <a:p>
             <a:fld id="{12D47082-DEE0-4172-B4B5-F7FDE94EB7DD}" type="datetimeFigureOut">
               <a:rPr lang="es-MX" smtClean="0"/>
-              <a:t>18/02/2019</a:t>
+              <a:t>21/02/2019</a:t>
             </a:fld>
             <a:endParaRPr lang="es-MX"/>
           </a:p>
@@ -1993,7 +1993,7 @@
           <a:p>
             <a:fld id="{12D47082-DEE0-4172-B4B5-F7FDE94EB7DD}" type="datetimeFigureOut">
               <a:rPr lang="es-MX" smtClean="0"/>
-              <a:t>18/02/2019</a:t>
+              <a:t>21/02/2019</a:t>
             </a:fld>
             <a:endParaRPr lang="es-MX"/>
           </a:p>
@@ -2106,7 +2106,7 @@
           <a:p>
             <a:fld id="{12D47082-DEE0-4172-B4B5-F7FDE94EB7DD}" type="datetimeFigureOut">
               <a:rPr lang="es-MX" smtClean="0"/>
-              <a:t>18/02/2019</a:t>
+              <a:t>21/02/2019</a:t>
             </a:fld>
             <a:endParaRPr lang="es-MX"/>
           </a:p>
@@ -2419,7 +2419,7 @@
           <a:p>
             <a:fld id="{12D47082-DEE0-4172-B4B5-F7FDE94EB7DD}" type="datetimeFigureOut">
               <a:rPr lang="es-MX" smtClean="0"/>
-              <a:t>18/02/2019</a:t>
+              <a:t>21/02/2019</a:t>
             </a:fld>
             <a:endParaRPr lang="es-MX"/>
           </a:p>
@@ -2708,7 +2708,7 @@
           <a:p>
             <a:fld id="{12D47082-DEE0-4172-B4B5-F7FDE94EB7DD}" type="datetimeFigureOut">
               <a:rPr lang="es-MX" smtClean="0"/>
-              <a:t>18/02/2019</a:t>
+              <a:t>21/02/2019</a:t>
             </a:fld>
             <a:endParaRPr lang="es-MX"/>
           </a:p>
@@ -2951,7 +2951,7 @@
           <a:p>
             <a:fld id="{12D47082-DEE0-4172-B4B5-F7FDE94EB7DD}" type="datetimeFigureOut">
               <a:rPr lang="es-MX" smtClean="0"/>
-              <a:t>18/02/2019</a:t>
+              <a:t>21/02/2019</a:t>
             </a:fld>
             <a:endParaRPr lang="es-MX"/>
           </a:p>
@@ -3465,7 +3465,7 @@
           <p:nvPr>
             <p:extLst>
               <p:ext uri="{D42A27DB-BD31-4B8C-83A1-F6EECF244321}">
-                <p14:modId xmlns:p14="http://schemas.microsoft.com/office/powerpoint/2010/main" val="3902461706"/>
+                <p14:modId xmlns:p14="http://schemas.microsoft.com/office/powerpoint/2010/main" val="3490089012"/>
               </p:ext>
             </p:extLst>
           </p:nvPr>
@@ -3549,6 +3549,10 @@
                     <a:bodyPr/>
                     <a:lstStyle/>
                     <a:p>
+                      <a:r>
+                        <a:rPr lang="es-MX" dirty="0" err="1"/>
+                        <a:t>Tipo_Concepto</a:t>
+                      </a:r>
                       <a:endParaRPr lang="es-MX" dirty="0"/>
                     </a:p>
                   </a:txBody>
@@ -3612,7 +3616,10 @@
                     <a:bodyPr/>
                     <a:lstStyle/>
                     <a:p>
-                      <a:endParaRPr lang="es-MX" dirty="0"/>
+                      <a:r>
+                        <a:rPr lang="es-MX" dirty="0"/>
+                        <a:t>Percepción</a:t>
+                      </a:r>
                     </a:p>
                   </a:txBody>
                   <a:tcPr/>
@@ -3692,7 +3699,10 @@
                         <a:tabLst/>
                         <a:defRPr/>
                       </a:pPr>
-                      <a:endParaRPr lang="es-MX" dirty="0"/>
+                      <a:r>
+                        <a:rPr lang="es-MX" dirty="0"/>
+                        <a:t>Percepción</a:t>
+                      </a:r>
                     </a:p>
                   </a:txBody>
                   <a:tcPr/>
@@ -3875,7 +3885,27 @@
                     <a:bodyPr/>
                     <a:lstStyle/>
                     <a:p>
-                      <a:endParaRPr lang="es-MX" dirty="0"/>
+                      <a:pPr marL="0" marR="0" lvl="0" indent="0" algn="l" defTabSz="914400" rtl="0" eaLnBrk="1" fontAlgn="auto" latinLnBrk="0" hangingPunct="1">
+                        <a:lnSpc>
+                          <a:spcPct val="100000"/>
+                        </a:lnSpc>
+                        <a:spcBef>
+                          <a:spcPts val="0"/>
+                        </a:spcBef>
+                        <a:spcAft>
+                          <a:spcPts val="0"/>
+                        </a:spcAft>
+                        <a:buClrTx/>
+                        <a:buSzTx/>
+                        <a:buFontTx/>
+                        <a:buNone/>
+                        <a:tabLst/>
+                        <a:defRPr/>
+                      </a:pPr>
+                      <a:r>
+                        <a:rPr lang="es-MX" dirty="0"/>
+                        <a:t>Deducción</a:t>
+                      </a:r>
                     </a:p>
                   </a:txBody>
                   <a:tcPr/>

</xml_diff>